<commit_message>
Add tag to CONTRIBUTING.md to demonstrate 1-to-many. Add powerpoint class diagram. Add linqPad for looking at data in Cosmos.
</commit_message>
<xml_diff>
--- a/Planetary Docs Class Diagram.pptx
+++ b/Planetary Docs Class Diagram.pptx
@@ -5,8 +5,7 @@
     <p:sldMasterId id="2147483648" r:id="rId1"/>
   </p:sldMasterIdLst>
   <p:sldIdLst>
-    <p:sldId id="256" r:id="rId2"/>
-    <p:sldId id="257" r:id="rId3"/>
+    <p:sldId id="257" r:id="rId2"/>
   </p:sldIdLst>
   <p:sldSz cx="12192000" cy="6858000"/>
   <p:notesSz cx="6858000" cy="9144000"/>
@@ -105,6 +104,11 @@
       </a:defRPr>
     </a:lvl9pPr>
   </p:defaultTextStyle>
+  <p:extLst>
+    <p:ext uri="{EFAFB233-063F-42B5-8137-9DF3F51BA10A}">
+      <p15:sldGuideLst xmlns:p15="http://schemas.microsoft.com/office/powerpoint/2012/main"/>
+    </p:ext>
+  </p:extLst>
 </p:presentation>
 </file>
 
@@ -255,7 +259,7 @@
           <a:p>
             <a:fld id="{5EE698C3-2A86-4148-9C62-220FD647FF15}" type="datetimeFigureOut">
               <a:rPr lang="en-US" smtClean="0"/>
-              <a:t>12/4/2021</a:t>
+              <a:t>12/6/2021</a:t>
             </a:fld>
             <a:endParaRPr lang="en-US"/>
           </a:p>
@@ -453,7 +457,7 @@
           <a:p>
             <a:fld id="{5EE698C3-2A86-4148-9C62-220FD647FF15}" type="datetimeFigureOut">
               <a:rPr lang="en-US" smtClean="0"/>
-              <a:t>12/4/2021</a:t>
+              <a:t>12/6/2021</a:t>
             </a:fld>
             <a:endParaRPr lang="en-US"/>
           </a:p>
@@ -661,7 +665,7 @@
           <a:p>
             <a:fld id="{5EE698C3-2A86-4148-9C62-220FD647FF15}" type="datetimeFigureOut">
               <a:rPr lang="en-US" smtClean="0"/>
-              <a:t>12/4/2021</a:t>
+              <a:t>12/6/2021</a:t>
             </a:fld>
             <a:endParaRPr lang="en-US"/>
           </a:p>
@@ -859,7 +863,7 @@
           <a:p>
             <a:fld id="{5EE698C3-2A86-4148-9C62-220FD647FF15}" type="datetimeFigureOut">
               <a:rPr lang="en-US" smtClean="0"/>
-              <a:t>12/4/2021</a:t>
+              <a:t>12/6/2021</a:t>
             </a:fld>
             <a:endParaRPr lang="en-US"/>
           </a:p>
@@ -1134,7 +1138,7 @@
           <a:p>
             <a:fld id="{5EE698C3-2A86-4148-9C62-220FD647FF15}" type="datetimeFigureOut">
               <a:rPr lang="en-US" smtClean="0"/>
-              <a:t>12/4/2021</a:t>
+              <a:t>12/6/2021</a:t>
             </a:fld>
             <a:endParaRPr lang="en-US"/>
           </a:p>
@@ -1399,7 +1403,7 @@
           <a:p>
             <a:fld id="{5EE698C3-2A86-4148-9C62-220FD647FF15}" type="datetimeFigureOut">
               <a:rPr lang="en-US" smtClean="0"/>
-              <a:t>12/4/2021</a:t>
+              <a:t>12/6/2021</a:t>
             </a:fld>
             <a:endParaRPr lang="en-US"/>
           </a:p>
@@ -1811,7 +1815,7 @@
           <a:p>
             <a:fld id="{5EE698C3-2A86-4148-9C62-220FD647FF15}" type="datetimeFigureOut">
               <a:rPr lang="en-US" smtClean="0"/>
-              <a:t>12/4/2021</a:t>
+              <a:t>12/6/2021</a:t>
             </a:fld>
             <a:endParaRPr lang="en-US"/>
           </a:p>
@@ -1952,7 +1956,7 @@
           <a:p>
             <a:fld id="{5EE698C3-2A86-4148-9C62-220FD647FF15}" type="datetimeFigureOut">
               <a:rPr lang="en-US" smtClean="0"/>
-              <a:t>12/4/2021</a:t>
+              <a:t>12/6/2021</a:t>
             </a:fld>
             <a:endParaRPr lang="en-US"/>
           </a:p>
@@ -2065,7 +2069,7 @@
           <a:p>
             <a:fld id="{5EE698C3-2A86-4148-9C62-220FD647FF15}" type="datetimeFigureOut">
               <a:rPr lang="en-US" smtClean="0"/>
-              <a:t>12/4/2021</a:t>
+              <a:t>12/6/2021</a:t>
             </a:fld>
             <a:endParaRPr lang="en-US"/>
           </a:p>
@@ -2376,7 +2380,7 @@
           <a:p>
             <a:fld id="{5EE698C3-2A86-4148-9C62-220FD647FF15}" type="datetimeFigureOut">
               <a:rPr lang="en-US" smtClean="0"/>
-              <a:t>12/4/2021</a:t>
+              <a:t>12/6/2021</a:t>
             </a:fld>
             <a:endParaRPr lang="en-US"/>
           </a:p>
@@ -2664,7 +2668,7 @@
           <a:p>
             <a:fld id="{5EE698C3-2A86-4148-9C62-220FD647FF15}" type="datetimeFigureOut">
               <a:rPr lang="en-US" smtClean="0"/>
-              <a:t>12/4/2021</a:t>
+              <a:t>12/6/2021</a:t>
             </a:fld>
             <a:endParaRPr lang="en-US"/>
           </a:p>
@@ -2905,7 +2909,7 @@
           <a:p>
             <a:fld id="{5EE698C3-2A86-4148-9C62-220FD647FF15}" type="datetimeFigureOut">
               <a:rPr lang="en-US" smtClean="0"/>
-              <a:t>12/4/2021</a:t>
+              <a:t>12/6/2021</a:t>
             </a:fld>
             <a:endParaRPr lang="en-US"/>
           </a:p>
@@ -3327,15 +3331,15 @@
           <p:cNvPr id="2" name="Title 1">
             <a:extLst>
               <a:ext uri="{FF2B5EF4-FFF2-40B4-BE49-F238E27FC236}">
-                <a16:creationId xmlns:a16="http://schemas.microsoft.com/office/drawing/2014/main" id="{CF943119-FB61-48D9-BC4D-28B69FE8B6A6}"/>
-              </a:ext>
-            </a:extLst>
-          </p:cNvPr>
-          <p:cNvSpPr>
-            <a:spLocks noGrp="1"/>
-          </p:cNvSpPr>
-          <p:nvPr>
-            <p:ph type="ctrTitle"/>
+                <a16:creationId xmlns:a16="http://schemas.microsoft.com/office/drawing/2014/main" id="{2EBFE16A-FEEC-40F5-A07F-A4B3CFA8D851}"/>
+              </a:ext>
+            </a:extLst>
+          </p:cNvPr>
+          <p:cNvSpPr>
+            <a:spLocks noGrp="1"/>
+          </p:cNvSpPr>
+          <p:nvPr>
+            <p:ph type="title"/>
           </p:nvPr>
         </p:nvSpPr>
         <p:spPr/>
@@ -3343,87 +3347,14 @@
           <a:bodyPr/>
           <a:lstStyle/>
           <a:p>
-            <a:endParaRPr lang="en-US"/>
-          </a:p>
-        </p:txBody>
-      </p:sp>
-      <p:sp>
-        <p:nvSpPr>
-          <p:cNvPr id="3" name="Subtitle 2">
-            <a:extLst>
-              <a:ext uri="{FF2B5EF4-FFF2-40B4-BE49-F238E27FC236}">
-                <a16:creationId xmlns:a16="http://schemas.microsoft.com/office/drawing/2014/main" id="{86666CEC-8C0E-452A-BC17-9CAE31914BDF}"/>
-              </a:ext>
-            </a:extLst>
-          </p:cNvPr>
-          <p:cNvSpPr>
-            <a:spLocks noGrp="1"/>
-          </p:cNvSpPr>
-          <p:nvPr>
-            <p:ph type="subTitle" idx="1"/>
-          </p:nvPr>
-        </p:nvSpPr>
-        <p:spPr/>
-        <p:txBody>
-          <a:bodyPr/>
-          <a:lstStyle/>
-          <a:p>
-            <a:endParaRPr lang="en-US"/>
-          </a:p>
-        </p:txBody>
-      </p:sp>
-    </p:spTree>
-    <p:extLst>
-      <p:ext uri="{BB962C8B-B14F-4D97-AF65-F5344CB8AC3E}">
-        <p14:creationId xmlns:p14="http://schemas.microsoft.com/office/powerpoint/2010/main" val="3160825334"/>
-      </p:ext>
-    </p:extLst>
-  </p:cSld>
-  <p:clrMapOvr>
-    <a:masterClrMapping/>
-  </p:clrMapOvr>
-</p:sld>
-</file>
-
-<file path=ppt/slides/slide2.xml><?xml version="1.0" encoding="utf-8"?>
-<p:sld xmlns:a="http://schemas.openxmlformats.org/drawingml/2006/main" xmlns:r="http://schemas.openxmlformats.org/officeDocument/2006/relationships" xmlns:p="http://schemas.openxmlformats.org/presentationml/2006/main">
-  <p:cSld>
-    <p:spTree>
-      <p:nvGrpSpPr>
-        <p:cNvPr id="1" name=""/>
-        <p:cNvGrpSpPr/>
-        <p:nvPr/>
-      </p:nvGrpSpPr>
-      <p:grpSpPr>
-        <a:xfrm>
-          <a:off x="0" y="0"/>
-          <a:ext cx="0" cy="0"/>
-          <a:chOff x="0" y="0"/>
-          <a:chExt cx="0" cy="0"/>
-        </a:xfrm>
-      </p:grpSpPr>
-      <p:sp>
-        <p:nvSpPr>
-          <p:cNvPr id="2" name="Title 1">
-            <a:extLst>
-              <a:ext uri="{FF2B5EF4-FFF2-40B4-BE49-F238E27FC236}">
-                <a16:creationId xmlns:a16="http://schemas.microsoft.com/office/drawing/2014/main" id="{2EBFE16A-FEEC-40F5-A07F-A4B3CFA8D851}"/>
-              </a:ext>
-            </a:extLst>
-          </p:cNvPr>
-          <p:cNvSpPr>
-            <a:spLocks noGrp="1"/>
-          </p:cNvSpPr>
-          <p:nvPr>
-            <p:ph type="title"/>
-          </p:nvPr>
-        </p:nvSpPr>
-        <p:spPr/>
-        <p:txBody>
-          <a:bodyPr/>
-          <a:lstStyle/>
-          <a:p>
-            <a:endParaRPr lang="en-US"/>
+            <a:r>
+              <a:rPr lang="en-US" dirty="0"/>
+              <a:t>Class Diagram (</a:t>
+            </a:r>
+            <a:r>
+              <a:rPr lang="en-US"/>
+              <a:t>arrow means one-to-many)</a:t>
+            </a:r>
           </a:p>
         </p:txBody>
       </p:sp>

</xml_diff>